<commit_message>
dropdown, torch, python 3.10 also working on the training of neural network. changes to index, adding the input listeners. may be subject to change if the user wants to customize model etc.
</commit_message>
<xml_diff>
--- a/raman_week5.pptx
+++ b/raman_week5.pptx
@@ -8,6 +8,7 @@
     <p:sldId id="256" r:id="rId2"/>
     <p:sldId id="257" r:id="rId3"/>
     <p:sldId id="258" r:id="rId4"/>
+    <p:sldId id="259" r:id="rId5"/>
   </p:sldIdLst>
   <p:sldSz cx="12192000" cy="6858000"/>
   <p:notesSz cx="6858000" cy="9144000"/>
@@ -106,6 +107,11 @@
       </a:defRPr>
     </a:lvl9pPr>
   </p:defaultTextStyle>
+  <p:extLst>
+    <p:ext uri="{EFAFB233-063F-42B5-8137-9DF3F51BA10A}">
+      <p15:sldGuideLst xmlns:p15="http://schemas.microsoft.com/office/powerpoint/2012/main"/>
+    </p:ext>
+  </p:extLst>
 </p:presentation>
 </file>
 
@@ -258,7 +264,7 @@
           <a:p>
             <a:fld id="{6822D85E-D2FB-42BA-8FC7-836FE23099A3}" type="datetimeFigureOut">
               <a:rPr lang="en-CH" smtClean="0"/>
-              <a:t>09.10.2025</a:t>
+              <a:t>20.10.2025</a:t>
             </a:fld>
             <a:endParaRPr lang="en-CH"/>
           </a:p>
@@ -458,7 +464,7 @@
           <a:p>
             <a:fld id="{6822D85E-D2FB-42BA-8FC7-836FE23099A3}" type="datetimeFigureOut">
               <a:rPr lang="en-CH" smtClean="0"/>
-              <a:t>09.10.2025</a:t>
+              <a:t>20.10.2025</a:t>
             </a:fld>
             <a:endParaRPr lang="en-CH"/>
           </a:p>
@@ -668,7 +674,7 @@
           <a:p>
             <a:fld id="{6822D85E-D2FB-42BA-8FC7-836FE23099A3}" type="datetimeFigureOut">
               <a:rPr lang="en-CH" smtClean="0"/>
-              <a:t>09.10.2025</a:t>
+              <a:t>20.10.2025</a:t>
             </a:fld>
             <a:endParaRPr lang="en-CH"/>
           </a:p>
@@ -868,7 +874,7 @@
           <a:p>
             <a:fld id="{6822D85E-D2FB-42BA-8FC7-836FE23099A3}" type="datetimeFigureOut">
               <a:rPr lang="en-CH" smtClean="0"/>
-              <a:t>09.10.2025</a:t>
+              <a:t>20.10.2025</a:t>
             </a:fld>
             <a:endParaRPr lang="en-CH"/>
           </a:p>
@@ -1144,7 +1150,7 @@
           <a:p>
             <a:fld id="{6822D85E-D2FB-42BA-8FC7-836FE23099A3}" type="datetimeFigureOut">
               <a:rPr lang="en-CH" smtClean="0"/>
-              <a:t>09.10.2025</a:t>
+              <a:t>20.10.2025</a:t>
             </a:fld>
             <a:endParaRPr lang="en-CH"/>
           </a:p>
@@ -1412,7 +1418,7 @@
           <a:p>
             <a:fld id="{6822D85E-D2FB-42BA-8FC7-836FE23099A3}" type="datetimeFigureOut">
               <a:rPr lang="en-CH" smtClean="0"/>
-              <a:t>09.10.2025</a:t>
+              <a:t>20.10.2025</a:t>
             </a:fld>
             <a:endParaRPr lang="en-CH"/>
           </a:p>
@@ -1827,7 +1833,7 @@
           <a:p>
             <a:fld id="{6822D85E-D2FB-42BA-8FC7-836FE23099A3}" type="datetimeFigureOut">
               <a:rPr lang="en-CH" smtClean="0"/>
-              <a:t>09.10.2025</a:t>
+              <a:t>20.10.2025</a:t>
             </a:fld>
             <a:endParaRPr lang="en-CH"/>
           </a:p>
@@ -1969,7 +1975,7 @@
           <a:p>
             <a:fld id="{6822D85E-D2FB-42BA-8FC7-836FE23099A3}" type="datetimeFigureOut">
               <a:rPr lang="en-CH" smtClean="0"/>
-              <a:t>09.10.2025</a:t>
+              <a:t>20.10.2025</a:t>
             </a:fld>
             <a:endParaRPr lang="en-CH"/>
           </a:p>
@@ -2082,7 +2088,7 @@
           <a:p>
             <a:fld id="{6822D85E-D2FB-42BA-8FC7-836FE23099A3}" type="datetimeFigureOut">
               <a:rPr lang="en-CH" smtClean="0"/>
-              <a:t>09.10.2025</a:t>
+              <a:t>20.10.2025</a:t>
             </a:fld>
             <a:endParaRPr lang="en-CH"/>
           </a:p>
@@ -2395,7 +2401,7 @@
           <a:p>
             <a:fld id="{6822D85E-D2FB-42BA-8FC7-836FE23099A3}" type="datetimeFigureOut">
               <a:rPr lang="en-CH" smtClean="0"/>
-              <a:t>09.10.2025</a:t>
+              <a:t>20.10.2025</a:t>
             </a:fld>
             <a:endParaRPr lang="en-CH"/>
           </a:p>
@@ -2684,7 +2690,7 @@
           <a:p>
             <a:fld id="{6822D85E-D2FB-42BA-8FC7-836FE23099A3}" type="datetimeFigureOut">
               <a:rPr lang="en-CH" smtClean="0"/>
-              <a:t>09.10.2025</a:t>
+              <a:t>20.10.2025</a:t>
             </a:fld>
             <a:endParaRPr lang="en-CH"/>
           </a:p>
@@ -2927,7 +2933,7 @@
           <a:p>
             <a:fld id="{6822D85E-D2FB-42BA-8FC7-836FE23099A3}" type="datetimeFigureOut">
               <a:rPr lang="en-CH" smtClean="0"/>
-              <a:t>09.10.2025</a:t>
+              <a:t>20.10.2025</a:t>
             </a:fld>
             <a:endParaRPr lang="en-CH"/>
           </a:p>
@@ -3624,7 +3630,7 @@
         <p:spPr>
           <a:xfrm>
             <a:off x="292231" y="2626308"/>
-            <a:ext cx="8748074" cy="2862322"/>
+            <a:ext cx="8748074" cy="2800767"/>
           </a:xfrm>
           <a:prstGeom prst="rect">
             <a:avLst/>
@@ -3670,30 +3676,37 @@
           <a:p>
             <a:r>
               <a:rPr lang="en-US" dirty="0"/>
-              <a:t>- </a:t>
+              <a:t>-     Give percentages of similarity for many samples.</a:t>
             </a:r>
           </a:p>
           <a:p>
             <a:endParaRPr lang="en-US" dirty="0"/>
           </a:p>
           <a:p>
-            <a:endParaRPr lang="en-US" dirty="0"/>
-          </a:p>
-          <a:p>
             <a:r>
               <a:rPr lang="en-US" dirty="0"/>
-              <a:t>-</a:t>
-            </a:r>
-            <a:r>
-              <a:rPr lang="en-US" dirty="0" err="1"/>
-              <a:t>asd</a:t>
-            </a:r>
-            <a:endParaRPr lang="en-US" dirty="0"/>
-          </a:p>
-          <a:p>
-            <a:endParaRPr lang="en-US" dirty="0"/>
-          </a:p>
-          <a:p>
+              <a:t>Inputs of the NN :</a:t>
+            </a:r>
+          </a:p>
+          <a:p>
+            <a:pPr marL="285750" indent="-285750">
+              <a:buFontTx/>
+              <a:buChar char="-"/>
+            </a:pPr>
+            <a:r>
+              <a:rPr lang="en-US" dirty="0"/>
+              <a:t>Samples </a:t>
+            </a:r>
+            <a:r>
+              <a:rPr lang="en-US" sz="1400" dirty="0"/>
+              <a:t>(ideally many samples for each plastic, in different conditions, different ages (only have this in one database))</a:t>
+            </a:r>
+          </a:p>
+          <a:p>
+            <a:pPr marL="285750" indent="-285750">
+              <a:buFontTx/>
+              <a:buChar char="-"/>
+            </a:pPr>
             <a:endParaRPr lang="en-US" dirty="0"/>
           </a:p>
         </p:txBody>
@@ -3995,7 +4008,10 @@
             <a:endParaRPr lang="en-US" sz="1400" dirty="0"/>
           </a:p>
           <a:p>
-            <a:endParaRPr lang="en-US" sz="1400" dirty="0"/>
+            <a:r>
+              <a:rPr lang="en-US" sz="1400" dirty="0"/>
+              <a:t>Convolutional first layer is necessary to capture (local steep up (or down), local peak at X intensity value, local noise at points of no interest)</a:t>
+            </a:r>
           </a:p>
           <a:p>
             <a:endParaRPr lang="en-US" sz="1400" dirty="0"/>
@@ -4007,18 +4023,25 @@
             </a:r>
           </a:p>
           <a:p>
-            <a:endParaRPr lang="en-US" sz="1100" dirty="0"/>
-          </a:p>
-          <a:p>
-            <a:endParaRPr lang="en-US" sz="1100" dirty="0"/>
-          </a:p>
-          <a:p>
-            <a:endParaRPr lang="en-US" sz="1100" dirty="0"/>
-          </a:p>
-          <a:p>
-            <a:endParaRPr lang="en-US" sz="1100" dirty="0"/>
-          </a:p>
-          <a:p>
+            <a:pPr marL="0" indent="0">
+              <a:buNone/>
+            </a:pPr>
+            <a:endParaRPr lang="en-US" sz="1200" dirty="0"/>
+          </a:p>
+          <a:p>
+            <a:pPr marL="0" indent="0">
+              <a:buNone/>
+            </a:pPr>
+            <a:endParaRPr lang="en-US" sz="1200" dirty="0"/>
+          </a:p>
+          <a:p>
+            <a:pPr marL="0" indent="0">
+              <a:buNone/>
+            </a:pPr>
+            <a:r>
+              <a:rPr lang="en-US" sz="1200" dirty="0"/>
+              <a:t>-&gt; I will understand what macro features layers identify only during the training process</a:t>
+            </a:r>
             <a:endParaRPr lang="en-US" sz="1100" dirty="0"/>
           </a:p>
           <a:p>
@@ -4475,21 +4498,108 @@
             <p:ph idx="1"/>
           </p:nvPr>
         </p:nvSpPr>
-        <p:spPr/>
-        <p:txBody>
-          <a:bodyPr/>
-          <a:lstStyle/>
-          <a:p>
-            <a:endParaRPr lang="en-CH" dirty="0"/>
+        <p:spPr>
+          <a:xfrm>
+            <a:off x="7116117" y="340518"/>
+            <a:ext cx="4609158" cy="6176963"/>
+          </a:xfrm>
+        </p:spPr>
+        <p:txBody>
+          <a:bodyPr>
+            <a:normAutofit/>
+          </a:bodyPr>
+          <a:lstStyle/>
+          <a:p>
+            <a:pPr marL="0" indent="0">
+              <a:buNone/>
+            </a:pPr>
+            <a:r>
+              <a:rPr lang="fr-CH" sz="1600" dirty="0"/>
+              <a:t>-&gt; </a:t>
+            </a:r>
+            <a:r>
+              <a:rPr lang="fr-CH" sz="1600" dirty="0" err="1"/>
+              <a:t>I’m</a:t>
+            </a:r>
+            <a:r>
+              <a:rPr lang="fr-CH" sz="1600" dirty="0"/>
+              <a:t> not sure of </a:t>
+            </a:r>
+            <a:r>
+              <a:rPr lang="fr-CH" sz="1600" dirty="0" err="1"/>
+              <a:t>any</a:t>
+            </a:r>
+            <a:r>
+              <a:rPr lang="fr-CH" sz="1600" dirty="0"/>
+              <a:t> of the </a:t>
+            </a:r>
+            <a:r>
+              <a:rPr lang="fr-CH" sz="1600" dirty="0" err="1"/>
+              <a:t>layers</a:t>
+            </a:r>
+            <a:r>
+              <a:rPr lang="fr-CH" sz="1600" dirty="0"/>
+              <a:t> in the middle</a:t>
+            </a:r>
+          </a:p>
+          <a:p>
+            <a:pPr marL="0" indent="0">
+              <a:buNone/>
+            </a:pPr>
+            <a:r>
+              <a:rPr lang="fr-CH" sz="1600" dirty="0"/>
+              <a:t>-&gt; Dense </a:t>
+            </a:r>
+            <a:r>
+              <a:rPr lang="fr-CH" sz="1600" dirty="0" err="1"/>
+              <a:t>fully</a:t>
+            </a:r>
+            <a:r>
+              <a:rPr lang="fr-CH" sz="1600" dirty="0"/>
+              <a:t> </a:t>
+            </a:r>
+            <a:r>
+              <a:rPr lang="fr-CH" sz="1600" dirty="0" err="1"/>
+              <a:t>connected</a:t>
+            </a:r>
+            <a:r>
+              <a:rPr lang="fr-CH" sz="1600" dirty="0"/>
+              <a:t> </a:t>
+            </a:r>
+            <a:r>
+              <a:rPr lang="fr-CH" sz="1600" dirty="0" err="1"/>
+              <a:t>layers</a:t>
+            </a:r>
+            <a:r>
+              <a:rPr lang="fr-CH" sz="1600" dirty="0"/>
+              <a:t> at the end </a:t>
+            </a:r>
+            <a:r>
+              <a:rPr lang="fr-CH" sz="1600" dirty="0" err="1"/>
+              <a:t>because</a:t>
+            </a:r>
+            <a:r>
+              <a:rPr lang="fr-CH" sz="1600" dirty="0"/>
+              <a:t> </a:t>
+            </a:r>
+            <a:r>
+              <a:rPr lang="fr-CH" sz="1600" dirty="0" err="1"/>
+              <a:t>peaks</a:t>
+            </a:r>
+            <a:r>
+              <a:rPr lang="fr-CH" sz="1600" dirty="0"/>
+              <a:t> -&gt; plastic(s)</a:t>
+            </a:r>
+            <a:endParaRPr lang="en-CH" sz="1600" dirty="0"/>
           </a:p>
         </p:txBody>
       </p:sp>
       <p:pic>
         <p:nvPicPr>
-          <p:cNvPr id="5" name="Picture 4">
-            <a:extLst>
-              <a:ext uri="{FF2B5EF4-FFF2-40B4-BE49-F238E27FC236}">
-                <a16:creationId xmlns:a16="http://schemas.microsoft.com/office/drawing/2014/main" id="{3B536626-2EDE-6577-8715-8BE07D851207}"/>
+          <p:cNvPr id="6" name="Picture 5">
+            <a:extLst>
+              <a:ext uri="{FF2B5EF4-FFF2-40B4-BE49-F238E27FC236}">
+                <a16:creationId xmlns:a16="http://schemas.microsoft.com/office/drawing/2014/main" id="{3E24C554-B967-725E-1C95-6D43CDACDFEA}"/>
               </a:ext>
             </a:extLst>
           </p:cNvPr>
@@ -4506,8 +4616,8 @@
         </p:blipFill>
         <p:spPr>
           <a:xfrm>
-            <a:off x="151215" y="2883877"/>
-            <a:ext cx="5610052" cy="2525346"/>
+            <a:off x="77118" y="1128205"/>
+            <a:ext cx="6744641" cy="4877481"/>
           </a:xfrm>
           <a:prstGeom prst="rect">
             <a:avLst/>
@@ -4518,6 +4628,109 @@
     <p:extLst>
       <p:ext uri="{BB962C8B-B14F-4D97-AF65-F5344CB8AC3E}">
         <p14:creationId xmlns:p14="http://schemas.microsoft.com/office/powerpoint/2010/main" val="3978462420"/>
+      </p:ext>
+    </p:extLst>
+  </p:cSld>
+  <p:clrMapOvr>
+    <a:masterClrMapping/>
+  </p:clrMapOvr>
+</p:sld>
+</file>
+
+<file path=ppt/slides/slide4.xml><?xml version="1.0" encoding="utf-8"?>
+<p:sld xmlns:a="http://schemas.openxmlformats.org/drawingml/2006/main" xmlns:r="http://schemas.openxmlformats.org/officeDocument/2006/relationships" xmlns:p="http://schemas.openxmlformats.org/presentationml/2006/main">
+  <p:cSld>
+    <p:spTree>
+      <p:nvGrpSpPr>
+        <p:cNvPr id="1" name=""/>
+        <p:cNvGrpSpPr/>
+        <p:nvPr/>
+      </p:nvGrpSpPr>
+      <p:grpSpPr>
+        <a:xfrm>
+          <a:off x="0" y="0"/>
+          <a:ext cx="0" cy="0"/>
+          <a:chOff x="0" y="0"/>
+          <a:chExt cx="0" cy="0"/>
+        </a:xfrm>
+      </p:grpSpPr>
+      <p:sp>
+        <p:nvSpPr>
+          <p:cNvPr id="2" name="Title 1">
+            <a:extLst>
+              <a:ext uri="{FF2B5EF4-FFF2-40B4-BE49-F238E27FC236}">
+                <a16:creationId xmlns:a16="http://schemas.microsoft.com/office/drawing/2014/main" id="{5C047A58-D5AA-CF38-B086-95D01E2B35D6}"/>
+              </a:ext>
+            </a:extLst>
+          </p:cNvPr>
+          <p:cNvSpPr>
+            <a:spLocks noGrp="1"/>
+          </p:cNvSpPr>
+          <p:nvPr>
+            <p:ph type="title"/>
+          </p:nvPr>
+        </p:nvSpPr>
+        <p:spPr/>
+        <p:txBody>
+          <a:bodyPr/>
+          <a:lstStyle/>
+          <a:p>
+            <a:endParaRPr lang="en-US"/>
+          </a:p>
+        </p:txBody>
+      </p:sp>
+      <p:sp>
+        <p:nvSpPr>
+          <p:cNvPr id="3" name="Content Placeholder 2">
+            <a:extLst>
+              <a:ext uri="{FF2B5EF4-FFF2-40B4-BE49-F238E27FC236}">
+                <a16:creationId xmlns:a16="http://schemas.microsoft.com/office/drawing/2014/main" id="{D7748108-4169-790D-C3E5-EF12976B8C5E}"/>
+              </a:ext>
+            </a:extLst>
+          </p:cNvPr>
+          <p:cNvSpPr>
+            <a:spLocks noGrp="1"/>
+          </p:cNvSpPr>
+          <p:nvPr>
+            <p:ph idx="1"/>
+          </p:nvPr>
+        </p:nvSpPr>
+        <p:spPr/>
+        <p:txBody>
+          <a:bodyPr>
+            <a:normAutofit/>
+          </a:bodyPr>
+          <a:lstStyle/>
+          <a:p>
+            <a:pPr marL="0" indent="0">
+              <a:buNone/>
+            </a:pPr>
+            <a:r>
+              <a:rPr lang="en-US" sz="1800" dirty="0"/>
+              <a:t>Problems to solve</a:t>
+            </a:r>
+          </a:p>
+          <a:p>
+            <a:pPr marL="0" indent="0">
+              <a:buNone/>
+            </a:pPr>
+            <a:r>
+              <a:rPr lang="en-US" sz="1800" dirty="0"/>
+              <a:t>Database structure: how to feed all the samples to the network (separate the samples by sample ID)</a:t>
+            </a:r>
+          </a:p>
+          <a:p>
+            <a:pPr marL="0" indent="0">
+              <a:buNone/>
+            </a:pPr>
+            <a:endParaRPr lang="en-US" sz="1800" dirty="0"/>
+          </a:p>
+        </p:txBody>
+      </p:sp>
+    </p:spTree>
+    <p:extLst>
+      <p:ext uri="{BB962C8B-B14F-4D97-AF65-F5344CB8AC3E}">
+        <p14:creationId xmlns:p14="http://schemas.microsoft.com/office/powerpoint/2010/main" val="2822131384"/>
       </p:ext>
     </p:extLst>
   </p:cSld>

</xml_diff>